<commit_message>
Add basic event listening demo, add the idea of bubbling and capturing
</commit_message>
<xml_diff>
--- a/java-with-automation/week-3/javascript.pptx
+++ b/java-with-automation/week-3/javascript.pptx
@@ -267,7 +267,7 @@
           <a:p>
             <a:fld id="{53F55882-DF55-4FB2-807C-928D422B732E}" type="datetimeFigureOut">
               <a:rPr lang="en-US" smtClean="0"/>
-              <a:t>8/10/2021</a:t>
+              <a:t>8/12/2021</a:t>
             </a:fld>
             <a:endParaRPr lang="en-US"/>
           </a:p>
@@ -465,7 +465,7 @@
           <a:p>
             <a:fld id="{53F55882-DF55-4FB2-807C-928D422B732E}" type="datetimeFigureOut">
               <a:rPr lang="en-US" smtClean="0"/>
-              <a:t>8/10/2021</a:t>
+              <a:t>8/12/2021</a:t>
             </a:fld>
             <a:endParaRPr lang="en-US"/>
           </a:p>
@@ -673,7 +673,7 @@
           <a:p>
             <a:fld id="{53F55882-DF55-4FB2-807C-928D422B732E}" type="datetimeFigureOut">
               <a:rPr lang="en-US" smtClean="0"/>
-              <a:t>8/10/2021</a:t>
+              <a:t>8/12/2021</a:t>
             </a:fld>
             <a:endParaRPr lang="en-US"/>
           </a:p>
@@ -871,7 +871,7 @@
           <a:p>
             <a:fld id="{53F55882-DF55-4FB2-807C-928D422B732E}" type="datetimeFigureOut">
               <a:rPr lang="en-US" smtClean="0"/>
-              <a:t>8/10/2021</a:t>
+              <a:t>8/12/2021</a:t>
             </a:fld>
             <a:endParaRPr lang="en-US"/>
           </a:p>
@@ -1146,7 +1146,7 @@
           <a:p>
             <a:fld id="{53F55882-DF55-4FB2-807C-928D422B732E}" type="datetimeFigureOut">
               <a:rPr lang="en-US" smtClean="0"/>
-              <a:t>8/10/2021</a:t>
+              <a:t>8/12/2021</a:t>
             </a:fld>
             <a:endParaRPr lang="en-US"/>
           </a:p>
@@ -1411,7 +1411,7 @@
           <a:p>
             <a:fld id="{53F55882-DF55-4FB2-807C-928D422B732E}" type="datetimeFigureOut">
               <a:rPr lang="en-US" smtClean="0"/>
-              <a:t>8/10/2021</a:t>
+              <a:t>8/12/2021</a:t>
             </a:fld>
             <a:endParaRPr lang="en-US"/>
           </a:p>
@@ -1823,7 +1823,7 @@
           <a:p>
             <a:fld id="{53F55882-DF55-4FB2-807C-928D422B732E}" type="datetimeFigureOut">
               <a:rPr lang="en-US" smtClean="0"/>
-              <a:t>8/10/2021</a:t>
+              <a:t>8/12/2021</a:t>
             </a:fld>
             <a:endParaRPr lang="en-US"/>
           </a:p>
@@ -1964,7 +1964,7 @@
           <a:p>
             <a:fld id="{53F55882-DF55-4FB2-807C-928D422B732E}" type="datetimeFigureOut">
               <a:rPr lang="en-US" smtClean="0"/>
-              <a:t>8/10/2021</a:t>
+              <a:t>8/12/2021</a:t>
             </a:fld>
             <a:endParaRPr lang="en-US"/>
           </a:p>
@@ -2077,7 +2077,7 @@
           <a:p>
             <a:fld id="{53F55882-DF55-4FB2-807C-928D422B732E}" type="datetimeFigureOut">
               <a:rPr lang="en-US" smtClean="0"/>
-              <a:t>8/10/2021</a:t>
+              <a:t>8/12/2021</a:t>
             </a:fld>
             <a:endParaRPr lang="en-US"/>
           </a:p>
@@ -2388,7 +2388,7 @@
           <a:p>
             <a:fld id="{53F55882-DF55-4FB2-807C-928D422B732E}" type="datetimeFigureOut">
               <a:rPr lang="en-US" smtClean="0"/>
-              <a:t>8/10/2021</a:t>
+              <a:t>8/12/2021</a:t>
             </a:fld>
             <a:endParaRPr lang="en-US"/>
           </a:p>
@@ -2676,7 +2676,7 @@
           <a:p>
             <a:fld id="{53F55882-DF55-4FB2-807C-928D422B732E}" type="datetimeFigureOut">
               <a:rPr lang="en-US" smtClean="0"/>
-              <a:t>8/10/2021</a:t>
+              <a:t>8/12/2021</a:t>
             </a:fld>
             <a:endParaRPr lang="en-US"/>
           </a:p>
@@ -2917,7 +2917,7 @@
           <a:p>
             <a:fld id="{53F55882-DF55-4FB2-807C-928D422B732E}" type="datetimeFigureOut">
               <a:rPr lang="en-US" smtClean="0"/>
-              <a:t>8/10/2021</a:t>
+              <a:t>8/12/2021</a:t>
             </a:fld>
             <a:endParaRPr lang="en-US"/>
           </a:p>
@@ -3777,7 +3777,7 @@
         </p:nvSpPr>
         <p:spPr>
           <a:xfrm>
-            <a:off x="2496447" y="5247186"/>
+            <a:off x="2500977" y="5146906"/>
             <a:ext cx="858417" cy="427753"/>
           </a:xfrm>
           <a:prstGeom prst="rect">
@@ -3826,7 +3826,7 @@
         </p:nvSpPr>
         <p:spPr>
           <a:xfrm>
-            <a:off x="2496447" y="4710292"/>
+            <a:off x="2500976" y="4674320"/>
             <a:ext cx="858417" cy="427753"/>
           </a:xfrm>
           <a:prstGeom prst="rect">
@@ -3879,7 +3879,7 @@
         </p:nvSpPr>
         <p:spPr>
           <a:xfrm>
-            <a:off x="6628594" y="1254358"/>
+            <a:off x="6959390" y="1319296"/>
             <a:ext cx="4462943" cy="1754326"/>
           </a:xfrm>
           <a:prstGeom prst="rect">

</xml_diff>